<commit_message>
Update for 7/31 weekly meeting
</commit_message>
<xml_diff>
--- a/img/src/Data Flow.pptx
+++ b/img/src/Data Flow.pptx
@@ -6,6 +6,7 @@
   </p:sldMasterIdLst>
   <p:sldIdLst>
     <p:sldId id="256" r:id="rId2"/>
+    <p:sldId id="257" r:id="rId3"/>
   </p:sldIdLst>
   <p:sldSz cx="9144000" cy="6858000" type="screen4x3"/>
   <p:notesSz cx="6858000" cy="9144000"/>
@@ -241,7 +242,7 @@
           <a:p>
             <a:fld id="{0A332DED-15E1-46E2-9B7F-8655D76552CB}" type="datetimeFigureOut">
               <a:rPr lang="en-US" smtClean="0"/>
-              <a:t>7/15/2014</a:t>
+              <a:t>7/31/2014</a:t>
             </a:fld>
             <a:endParaRPr lang="en-US"/>
           </a:p>
@@ -554,7 +555,7 @@
           <a:p>
             <a:fld id="{0A332DED-15E1-46E2-9B7F-8655D76552CB}" type="datetimeFigureOut">
               <a:rPr lang="en-US" smtClean="0"/>
-              <a:t>7/15/2014</a:t>
+              <a:t>7/31/2014</a:t>
             </a:fld>
             <a:endParaRPr lang="en-US"/>
           </a:p>
@@ -739,7 +740,7 @@
           <a:p>
             <a:fld id="{0A332DED-15E1-46E2-9B7F-8655D76552CB}" type="datetimeFigureOut">
               <a:rPr lang="en-US" smtClean="0"/>
-              <a:t>7/15/2014</a:t>
+              <a:t>7/31/2014</a:t>
             </a:fld>
             <a:endParaRPr lang="en-US"/>
           </a:p>
@@ -914,7 +915,7 @@
           <a:p>
             <a:fld id="{0A332DED-15E1-46E2-9B7F-8655D76552CB}" type="datetimeFigureOut">
               <a:rPr lang="en-US" smtClean="0"/>
-              <a:t>7/15/2014</a:t>
+              <a:t>7/31/2014</a:t>
             </a:fld>
             <a:endParaRPr lang="en-US"/>
           </a:p>
@@ -1182,7 +1183,7 @@
           <a:p>
             <a:fld id="{0A332DED-15E1-46E2-9B7F-8655D76552CB}" type="datetimeFigureOut">
               <a:rPr lang="en-US" smtClean="0"/>
-              <a:t>7/15/2014</a:t>
+              <a:t>7/31/2014</a:t>
             </a:fld>
             <a:endParaRPr lang="en-US"/>
           </a:p>
@@ -1650,7 +1651,7 @@
           <a:p>
             <a:fld id="{0A332DED-15E1-46E2-9B7F-8655D76552CB}" type="datetimeFigureOut">
               <a:rPr lang="en-US" smtClean="0"/>
-              <a:t>7/15/2014</a:t>
+              <a:t>7/31/2014</a:t>
             </a:fld>
             <a:endParaRPr lang="en-US"/>
           </a:p>
@@ -2139,7 +2140,7 @@
           <a:p>
             <a:fld id="{0A332DED-15E1-46E2-9B7F-8655D76552CB}" type="datetimeFigureOut">
               <a:rPr lang="en-US" smtClean="0"/>
-              <a:t>7/15/2014</a:t>
+              <a:t>7/31/2014</a:t>
             </a:fld>
             <a:endParaRPr lang="en-US"/>
           </a:p>
@@ -2265,7 +2266,7 @@
           <a:p>
             <a:fld id="{0A332DED-15E1-46E2-9B7F-8655D76552CB}" type="datetimeFigureOut">
               <a:rPr lang="en-US" smtClean="0"/>
-              <a:t>7/15/2014</a:t>
+              <a:t>7/31/2014</a:t>
             </a:fld>
             <a:endParaRPr lang="en-US"/>
           </a:p>
@@ -2361,7 +2362,7 @@
           <a:p>
             <a:fld id="{0A332DED-15E1-46E2-9B7F-8655D76552CB}" type="datetimeFigureOut">
               <a:rPr lang="en-US" smtClean="0"/>
-              <a:t>7/15/2014</a:t>
+              <a:t>7/31/2014</a:t>
             </a:fld>
             <a:endParaRPr lang="en-US"/>
           </a:p>
@@ -2627,7 +2628,7 @@
           <a:p>
             <a:fld id="{0A332DED-15E1-46E2-9B7F-8655D76552CB}" type="datetimeFigureOut">
               <a:rPr lang="en-US" smtClean="0"/>
-              <a:t>7/15/2014</a:t>
+              <a:t>7/31/2014</a:t>
             </a:fld>
             <a:endParaRPr lang="en-US"/>
           </a:p>
@@ -2761,7 +2762,7 @@
           <a:p>
             <a:fld id="{0A332DED-15E1-46E2-9B7F-8655D76552CB}" type="datetimeFigureOut">
               <a:rPr lang="en-US" smtClean="0"/>
-              <a:t>7/15/2014</a:t>
+              <a:t>7/31/2014</a:t>
             </a:fld>
             <a:endParaRPr lang="en-US"/>
           </a:p>
@@ -3542,7 +3543,7 @@
           <a:p>
             <a:fld id="{0A332DED-15E1-46E2-9B7F-8655D76552CB}" type="datetimeFigureOut">
               <a:rPr lang="en-US" smtClean="0"/>
-              <a:t>7/15/2014</a:t>
+              <a:t>7/31/2014</a:t>
             </a:fld>
             <a:endParaRPr lang="en-US"/>
           </a:p>
@@ -6624,6 +6625,565 @@
 </p:sld>
 </file>
 
+<file path=ppt/slides/slide2.xml><?xml version="1.0" encoding="utf-8"?>
+<p:sld xmlns:a="http://schemas.openxmlformats.org/drawingml/2006/main" xmlns:r="http://schemas.openxmlformats.org/officeDocument/2006/relationships" xmlns:p="http://schemas.openxmlformats.org/presentationml/2006/main">
+  <p:cSld>
+    <p:bg>
+      <p:bgPr>
+        <a:solidFill>
+          <a:srgbClr val="FCF2C8"/>
+        </a:solidFill>
+        <a:effectLst/>
+      </p:bgPr>
+    </p:bg>
+    <p:spTree>
+      <p:nvGrpSpPr>
+        <p:cNvPr id="1" name=""/>
+        <p:cNvGrpSpPr/>
+        <p:nvPr/>
+      </p:nvGrpSpPr>
+      <p:grpSpPr>
+        <a:xfrm>
+          <a:off x="0" y="0"/>
+          <a:ext cx="0" cy="0"/>
+          <a:chOff x="0" y="0"/>
+          <a:chExt cx="0" cy="0"/>
+        </a:xfrm>
+      </p:grpSpPr>
+      <p:sp>
+        <p:nvSpPr>
+          <p:cNvPr id="5" name="Rounded Rectangle 4"/>
+          <p:cNvSpPr/>
+          <p:nvPr/>
+        </p:nvSpPr>
+        <p:spPr>
+          <a:xfrm>
+            <a:off x="3276600" y="3783327"/>
+            <a:ext cx="1752600" cy="914400"/>
+          </a:xfrm>
+          <a:prstGeom prst="roundRect">
+            <a:avLst/>
+          </a:prstGeom>
+        </p:spPr>
+        <p:style>
+          <a:lnRef idx="2">
+            <a:schemeClr val="accent4">
+              <a:shade val="50000"/>
+            </a:schemeClr>
+          </a:lnRef>
+          <a:fillRef idx="1">
+            <a:schemeClr val="accent4"/>
+          </a:fillRef>
+          <a:effectRef idx="0">
+            <a:schemeClr val="accent4"/>
+          </a:effectRef>
+          <a:fontRef idx="minor">
+            <a:schemeClr val="lt1"/>
+          </a:fontRef>
+        </p:style>
+        <p:txBody>
+          <a:bodyPr rtlCol="0" anchor="ctr"/>
+          <a:lstStyle/>
+          <a:p>
+            <a:pPr algn="ctr"/>
+            <a:r>
+              <a:rPr lang="en-US" sz="4000" dirty="0" smtClean="0">
+                <a:latin typeface="Lato" pitchFamily="34" charset="0"/>
+              </a:rPr>
+              <a:t>JS</a:t>
+            </a:r>
+            <a:endParaRPr lang="en-US" sz="4000" dirty="0">
+              <a:latin typeface="Lato" pitchFamily="34" charset="0"/>
+            </a:endParaRPr>
+          </a:p>
+        </p:txBody>
+      </p:sp>
+      <p:cxnSp>
+        <p:nvCxnSpPr>
+          <p:cNvPr id="7" name="Shape 6"/>
+          <p:cNvCxnSpPr>
+            <a:stCxn id="5" idx="1"/>
+            <a:endCxn id="4" idx="2"/>
+          </p:cNvCxnSpPr>
+          <p:nvPr/>
+        </p:nvCxnSpPr>
+        <p:spPr>
+          <a:xfrm rot="10800000" flipV="1">
+            <a:off x="1447800" y="4240526"/>
+            <a:ext cx="1828800" cy="179073"/>
+          </a:xfrm>
+          <a:prstGeom prst="bentConnector4">
+            <a:avLst>
+              <a:gd name="adj1" fmla="val 22917"/>
+              <a:gd name="adj2" fmla="val 382972"/>
+            </a:avLst>
+          </a:prstGeom>
+          <a:ln w="31750">
+            <a:solidFill>
+              <a:schemeClr val="accent3">
+                <a:lumMod val="75000"/>
+              </a:schemeClr>
+            </a:solidFill>
+            <a:tailEnd type="arrow"/>
+          </a:ln>
+        </p:spPr>
+        <p:style>
+          <a:lnRef idx="1">
+            <a:schemeClr val="accent1"/>
+          </a:lnRef>
+          <a:fillRef idx="0">
+            <a:schemeClr val="accent1"/>
+          </a:fillRef>
+          <a:effectRef idx="0">
+            <a:schemeClr val="accent1"/>
+          </a:effectRef>
+          <a:fontRef idx="minor">
+            <a:schemeClr val="tx1"/>
+          </a:fontRef>
+        </p:style>
+      </p:cxnSp>
+      <p:pic>
+        <p:nvPicPr>
+          <p:cNvPr id="1026" name="Picture 2" descr="C:\Users\Casey\Downloads\1405461706_wav.png"/>
+          <p:cNvPicPr>
+            <a:picLocks noChangeAspect="1" noChangeArrowheads="1"/>
+          </p:cNvPicPr>
+          <p:nvPr/>
+        </p:nvPicPr>
+        <p:blipFill>
+          <a:blip r:embed="rId2" cstate="print"/>
+          <a:srcRect/>
+          <a:stretch>
+            <a:fillRect/>
+          </a:stretch>
+        </p:blipFill>
+        <p:spPr bwMode="auto">
+          <a:xfrm>
+            <a:off x="2362200" y="4114800"/>
+            <a:ext cx="914400" cy="914400"/>
+          </a:xfrm>
+          <a:prstGeom prst="rect">
+            <a:avLst/>
+          </a:prstGeom>
+          <a:noFill/>
+        </p:spPr>
+      </p:pic>
+      <p:cxnSp>
+        <p:nvCxnSpPr>
+          <p:cNvPr id="104" name="Shape 103"/>
+          <p:cNvCxnSpPr>
+            <a:stCxn id="4" idx="0"/>
+            <a:endCxn id="5" idx="0"/>
+          </p:cNvCxnSpPr>
+          <p:nvPr/>
+        </p:nvCxnSpPr>
+        <p:spPr>
+          <a:xfrm rot="16200000" flipH="1">
+            <a:off x="2585086" y="2215513"/>
+            <a:ext cx="430527" cy="2705100"/>
+          </a:xfrm>
+          <a:prstGeom prst="bentConnector3">
+            <a:avLst>
+              <a:gd name="adj1" fmla="val -53098"/>
+            </a:avLst>
+          </a:prstGeom>
+          <a:ln w="31750">
+            <a:solidFill>
+              <a:schemeClr val="accent3">
+                <a:lumMod val="75000"/>
+              </a:schemeClr>
+            </a:solidFill>
+            <a:tailEnd type="arrow"/>
+          </a:ln>
+        </p:spPr>
+        <p:style>
+          <a:lnRef idx="1">
+            <a:schemeClr val="accent1"/>
+          </a:lnRef>
+          <a:fillRef idx="0">
+            <a:schemeClr val="accent1"/>
+          </a:fillRef>
+          <a:effectRef idx="0">
+            <a:schemeClr val="accent1"/>
+          </a:effectRef>
+          <a:fontRef idx="minor">
+            <a:schemeClr val="tx1"/>
+          </a:fontRef>
+        </p:style>
+      </p:cxnSp>
+      <p:sp>
+        <p:nvSpPr>
+          <p:cNvPr id="4" name="Rounded Rectangle 3"/>
+          <p:cNvSpPr/>
+          <p:nvPr/>
+        </p:nvSpPr>
+        <p:spPr>
+          <a:xfrm>
+            <a:off x="457200" y="3352800"/>
+            <a:ext cx="1981200" cy="1066800"/>
+          </a:xfrm>
+          <a:prstGeom prst="roundRect">
+            <a:avLst/>
+          </a:prstGeom>
+        </p:spPr>
+        <p:style>
+          <a:lnRef idx="2">
+            <a:schemeClr val="accent1">
+              <a:shade val="50000"/>
+            </a:schemeClr>
+          </a:lnRef>
+          <a:fillRef idx="1">
+            <a:schemeClr val="accent1"/>
+          </a:fillRef>
+          <a:effectRef idx="0">
+            <a:schemeClr val="accent1"/>
+          </a:effectRef>
+          <a:fontRef idx="minor">
+            <a:schemeClr val="lt1"/>
+          </a:fontRef>
+        </p:style>
+        <p:txBody>
+          <a:bodyPr rtlCol="0" anchor="ctr"/>
+          <a:lstStyle/>
+          <a:p>
+            <a:pPr algn="ctr"/>
+            <a:r>
+              <a:rPr lang="en-US" sz="3600" dirty="0" smtClean="0">
+                <a:latin typeface="Lato" pitchFamily="34" charset="0"/>
+              </a:rPr>
+              <a:t>Server</a:t>
+            </a:r>
+            <a:endParaRPr lang="en-US" sz="4000" dirty="0">
+              <a:latin typeface="Lato" pitchFamily="34" charset="0"/>
+            </a:endParaRPr>
+          </a:p>
+        </p:txBody>
+      </p:sp>
+      <p:sp>
+        <p:nvSpPr>
+          <p:cNvPr id="2" name="Flowchart: Predefined Process 1"/>
+          <p:cNvSpPr/>
+          <p:nvPr/>
+        </p:nvSpPr>
+        <p:spPr>
+          <a:xfrm>
+            <a:off x="5463540" y="2506979"/>
+            <a:ext cx="3276600" cy="685800"/>
+          </a:xfrm>
+          <a:prstGeom prst="flowChartPredefinedProcess">
+            <a:avLst/>
+          </a:prstGeom>
+        </p:spPr>
+        <p:style>
+          <a:lnRef idx="2">
+            <a:schemeClr val="accent3">
+              <a:shade val="50000"/>
+            </a:schemeClr>
+          </a:lnRef>
+          <a:fillRef idx="1">
+            <a:schemeClr val="accent3"/>
+          </a:fillRef>
+          <a:effectRef idx="0">
+            <a:schemeClr val="accent3"/>
+          </a:effectRef>
+          <a:fontRef idx="minor">
+            <a:schemeClr val="lt1"/>
+          </a:fontRef>
+        </p:style>
+        <p:txBody>
+          <a:bodyPr rtlCol="0" anchor="ctr"/>
+          <a:lstStyle/>
+          <a:p>
+            <a:pPr algn="ctr"/>
+            <a:r>
+              <a:rPr lang="en-US" sz="1400" dirty="0" err="1" smtClean="0">
+                <a:latin typeface="Consolas" panose="020B0609020204030204" pitchFamily="49" charset="0"/>
+                <a:cs typeface="Consolas" panose="020B0609020204030204" pitchFamily="49" charset="0"/>
+              </a:rPr>
+              <a:t>createScriptProcessor</a:t>
+            </a:r>
+            <a:endParaRPr lang="en-US" sz="1400" dirty="0">
+              <a:latin typeface="Consolas" panose="020B0609020204030204" pitchFamily="49" charset="0"/>
+              <a:cs typeface="Consolas" panose="020B0609020204030204" pitchFamily="49" charset="0"/>
+            </a:endParaRPr>
+          </a:p>
+        </p:txBody>
+      </p:sp>
+      <p:cxnSp>
+        <p:nvCxnSpPr>
+          <p:cNvPr id="38" name="Shape 103"/>
+          <p:cNvCxnSpPr>
+            <a:stCxn id="5" idx="3"/>
+            <a:endCxn id="2" idx="1"/>
+          </p:cNvCxnSpPr>
+          <p:nvPr/>
+        </p:nvCxnSpPr>
+        <p:spPr>
+          <a:xfrm flipV="1">
+            <a:off x="5029200" y="2849879"/>
+            <a:ext cx="434340" cy="1390648"/>
+          </a:xfrm>
+          <a:prstGeom prst="bentConnector3">
+            <a:avLst>
+              <a:gd name="adj1" fmla="val 34211"/>
+            </a:avLst>
+          </a:prstGeom>
+          <a:ln w="31750">
+            <a:solidFill>
+              <a:schemeClr val="accent3">
+                <a:lumMod val="75000"/>
+              </a:schemeClr>
+            </a:solidFill>
+            <a:tailEnd type="arrow"/>
+          </a:ln>
+        </p:spPr>
+        <p:style>
+          <a:lnRef idx="1">
+            <a:schemeClr val="accent1"/>
+          </a:lnRef>
+          <a:fillRef idx="0">
+            <a:schemeClr val="accent1"/>
+          </a:fillRef>
+          <a:effectRef idx="0">
+            <a:schemeClr val="accent1"/>
+          </a:effectRef>
+          <a:fontRef idx="minor">
+            <a:schemeClr val="tx1"/>
+          </a:fontRef>
+        </p:style>
+      </p:cxnSp>
+      <p:sp>
+        <p:nvSpPr>
+          <p:cNvPr id="53" name="Rounded Rectangle 52"/>
+          <p:cNvSpPr/>
+          <p:nvPr/>
+        </p:nvSpPr>
+        <p:spPr>
+          <a:xfrm>
+            <a:off x="5518785" y="3760457"/>
+            <a:ext cx="2101215" cy="1402086"/>
+          </a:xfrm>
+          <a:prstGeom prst="roundRect">
+            <a:avLst/>
+          </a:prstGeom>
+        </p:spPr>
+        <p:style>
+          <a:lnRef idx="2">
+            <a:schemeClr val="accent4">
+              <a:shade val="50000"/>
+            </a:schemeClr>
+          </a:lnRef>
+          <a:fillRef idx="1">
+            <a:schemeClr val="accent4"/>
+          </a:fillRef>
+          <a:effectRef idx="0">
+            <a:schemeClr val="accent4"/>
+          </a:effectRef>
+          <a:fontRef idx="minor">
+            <a:schemeClr val="lt1"/>
+          </a:fontRef>
+        </p:style>
+        <p:txBody>
+          <a:bodyPr rtlCol="0" anchor="ctr"/>
+          <a:lstStyle/>
+          <a:p>
+            <a:pPr algn="ctr"/>
+            <a:r>
+              <a:rPr lang="en-US" sz="2800" dirty="0" smtClean="0">
+                <a:latin typeface="Lato" pitchFamily="34" charset="0"/>
+              </a:rPr>
+              <a:t>Processor</a:t>
+            </a:r>
+            <a:endParaRPr lang="en-US" sz="2800" dirty="0">
+              <a:latin typeface="Lato" pitchFamily="34" charset="0"/>
+            </a:endParaRPr>
+          </a:p>
+        </p:txBody>
+      </p:sp>
+      <p:sp>
+        <p:nvSpPr>
+          <p:cNvPr id="44" name="Flowchart: Predefined Process 43"/>
+          <p:cNvSpPr/>
+          <p:nvPr/>
+        </p:nvSpPr>
+        <p:spPr>
+          <a:xfrm>
+            <a:off x="5830254" y="4785346"/>
+            <a:ext cx="2129790" cy="800101"/>
+          </a:xfrm>
+          <a:prstGeom prst="flowChartPredefinedProcess">
+            <a:avLst/>
+          </a:prstGeom>
+        </p:spPr>
+        <p:style>
+          <a:lnRef idx="2">
+            <a:schemeClr val="accent3">
+              <a:shade val="50000"/>
+            </a:schemeClr>
+          </a:lnRef>
+          <a:fillRef idx="1">
+            <a:schemeClr val="accent3"/>
+          </a:fillRef>
+          <a:effectRef idx="0">
+            <a:schemeClr val="accent3"/>
+          </a:effectRef>
+          <a:fontRef idx="minor">
+            <a:schemeClr val="lt1"/>
+          </a:fontRef>
+        </p:style>
+        <p:txBody>
+          <a:bodyPr rtlCol="0" anchor="ctr"/>
+          <a:lstStyle/>
+          <a:p>
+            <a:pPr algn="ctr"/>
+            <a:r>
+              <a:rPr lang="en-US" dirty="0" smtClean="0"/>
+              <a:t>wavencoder.js</a:t>
+            </a:r>
+            <a:endParaRPr lang="en-US" dirty="0"/>
+          </a:p>
+        </p:txBody>
+      </p:sp>
+      <p:cxnSp>
+        <p:nvCxnSpPr>
+          <p:cNvPr id="54" name="Shape 103"/>
+          <p:cNvCxnSpPr>
+            <a:endCxn id="53" idx="3"/>
+          </p:cNvCxnSpPr>
+          <p:nvPr/>
+        </p:nvCxnSpPr>
+        <p:spPr>
+          <a:xfrm rot="5400000">
+            <a:off x="7214241" y="3598538"/>
+            <a:ext cx="1268722" cy="457203"/>
+          </a:xfrm>
+          <a:prstGeom prst="bentConnector2">
+            <a:avLst/>
+          </a:prstGeom>
+          <a:ln w="31750">
+            <a:solidFill>
+              <a:schemeClr val="accent3">
+                <a:lumMod val="75000"/>
+              </a:schemeClr>
+            </a:solidFill>
+            <a:tailEnd type="arrow"/>
+          </a:ln>
+        </p:spPr>
+        <p:style>
+          <a:lnRef idx="1">
+            <a:schemeClr val="accent1"/>
+          </a:lnRef>
+          <a:fillRef idx="0">
+            <a:schemeClr val="accent1"/>
+          </a:fillRef>
+          <a:effectRef idx="0">
+            <a:schemeClr val="accent1"/>
+          </a:effectRef>
+          <a:fontRef idx="minor">
+            <a:schemeClr val="tx1"/>
+          </a:fontRef>
+        </p:style>
+      </p:cxnSp>
+      <p:sp>
+        <p:nvSpPr>
+          <p:cNvPr id="34" name="Cube 33"/>
+          <p:cNvSpPr/>
+          <p:nvPr/>
+        </p:nvSpPr>
+        <p:spPr>
+          <a:xfrm>
+            <a:off x="7793356" y="3434709"/>
+            <a:ext cx="1057274" cy="784859"/>
+          </a:xfrm>
+          <a:prstGeom prst="cube">
+            <a:avLst/>
+          </a:prstGeom>
+        </p:spPr>
+        <p:style>
+          <a:lnRef idx="2">
+            <a:schemeClr val="accent1">
+              <a:shade val="50000"/>
+            </a:schemeClr>
+          </a:lnRef>
+          <a:fillRef idx="1">
+            <a:schemeClr val="accent1"/>
+          </a:fillRef>
+          <a:effectRef idx="0">
+            <a:schemeClr val="accent1"/>
+          </a:effectRef>
+          <a:fontRef idx="minor">
+            <a:schemeClr val="lt1"/>
+          </a:fontRef>
+        </p:style>
+        <p:txBody>
+          <a:bodyPr rtlCol="0" anchor="ctr"/>
+          <a:lstStyle/>
+          <a:p>
+            <a:pPr algn="ctr"/>
+            <a:r>
+              <a:rPr lang="en-US" sz="1600" dirty="0" smtClean="0"/>
+              <a:t>Raw Audio</a:t>
+            </a:r>
+            <a:endParaRPr lang="en-US" sz="1600" dirty="0"/>
+          </a:p>
+        </p:txBody>
+      </p:sp>
+      <p:cxnSp>
+        <p:nvCxnSpPr>
+          <p:cNvPr id="63" name="Shape 6"/>
+          <p:cNvCxnSpPr>
+            <a:stCxn id="44" idx="2"/>
+            <a:endCxn id="5" idx="2"/>
+          </p:cNvCxnSpPr>
+          <p:nvPr/>
+        </p:nvCxnSpPr>
+        <p:spPr>
+          <a:xfrm rot="5400000" flipH="1">
+            <a:off x="5080165" y="3770463"/>
+            <a:ext cx="887720" cy="2742249"/>
+          </a:xfrm>
+          <a:prstGeom prst="bentConnector3">
+            <a:avLst>
+              <a:gd name="adj1" fmla="val -25751"/>
+            </a:avLst>
+          </a:prstGeom>
+          <a:ln w="31750">
+            <a:solidFill>
+              <a:schemeClr val="accent3">
+                <a:lumMod val="75000"/>
+              </a:schemeClr>
+            </a:solidFill>
+            <a:tailEnd type="arrow"/>
+          </a:ln>
+        </p:spPr>
+        <p:style>
+          <a:lnRef idx="1">
+            <a:schemeClr val="accent1"/>
+          </a:lnRef>
+          <a:fillRef idx="0">
+            <a:schemeClr val="accent1"/>
+          </a:fillRef>
+          <a:effectRef idx="0">
+            <a:schemeClr val="accent1"/>
+          </a:effectRef>
+          <a:fontRef idx="minor">
+            <a:schemeClr val="tx1"/>
+          </a:fontRef>
+        </p:style>
+      </p:cxnSp>
+    </p:spTree>
+    <p:extLst>
+      <p:ext uri="{BB962C8B-B14F-4D97-AF65-F5344CB8AC3E}">
+        <p14:creationId xmlns:p14="http://schemas.microsoft.com/office/powerpoint/2010/main" val="3574038865"/>
+      </p:ext>
+    </p:extLst>
+  </p:cSld>
+  <p:clrMapOvr>
+    <a:masterClrMapping/>
+  </p:clrMapOvr>
+</p:sld>
+</file>
+
 <file path=ppt/theme/theme1.xml><?xml version="1.0" encoding="utf-8"?>
 <a:theme xmlns:a="http://schemas.openxmlformats.org/drawingml/2006/main" name="Solstice">
   <a:themeElements>

</xml_diff>